<commit_message>
Add readme and aditional documentation
</commit_message>
<xml_diff>
--- a/prezentace/FloodFox.pptx
+++ b/prezentace/FloodFox.pptx
@@ -117,6 +117,22 @@
       </a:defRPr>
     </a:lvl9pPr>
   </p:defaultTextStyle>
+  <p:extLst>
+    <p:ext uri="{EFAFB233-063F-42B5-8137-9DF3F51BA10A}">
+      <p15:sldGuideLst xmlns:p15="http://schemas.microsoft.com/office/powerpoint/2012/main">
+        <p15:guide id="1" orient="horz" pos="2160">
+          <p15:clr>
+            <a:srgbClr val="A4A3A4"/>
+          </p15:clr>
+        </p15:guide>
+        <p15:guide id="2" pos="2880">
+          <p15:clr>
+            <a:srgbClr val="A4A3A4"/>
+          </p15:clr>
+        </p15:guide>
+      </p15:sldGuideLst>
+    </p:ext>
+  </p:extLst>
 </p:presentation>
 </file>
 
@@ -203,7 +219,7 @@
             <a:fld id="{A4C5F756-CF01-4EEB-86C4-9310F2BAB8E7}" type="datetimeFigureOut">
               <a:rPr lang="cs-CZ" smtClean="0"/>
               <a:pPr/>
-              <a:t>19.3.2016</a:t>
+              <a:t>24.03.2016</a:t>
             </a:fld>
             <a:endParaRPr lang="cs-CZ"/>
           </a:p>
@@ -269,38 +285,37 @@
           <a:p>
             <a:pPr lvl="0"/>
             <a:r>
-              <a:rPr lang="cs-CZ" smtClean="0"/>
+              <a:rPr lang="cs-CZ"/>
               <a:t>Klepnutím lze upravit styly předlohy textu.</a:t>
             </a:r>
           </a:p>
           <a:p>
             <a:pPr lvl="1"/>
             <a:r>
-              <a:rPr lang="cs-CZ" smtClean="0"/>
+              <a:rPr lang="cs-CZ"/>
               <a:t>Druhá úroveň</a:t>
             </a:r>
           </a:p>
           <a:p>
             <a:pPr lvl="2"/>
             <a:r>
-              <a:rPr lang="cs-CZ" smtClean="0"/>
+              <a:rPr lang="cs-CZ"/>
               <a:t>Třetí úroveň</a:t>
             </a:r>
           </a:p>
           <a:p>
             <a:pPr lvl="3"/>
             <a:r>
-              <a:rPr lang="cs-CZ" smtClean="0"/>
+              <a:rPr lang="cs-CZ"/>
               <a:t>Čtvrtá úroveň</a:t>
             </a:r>
           </a:p>
           <a:p>
             <a:pPr lvl="4"/>
             <a:r>
-              <a:rPr lang="cs-CZ" smtClean="0"/>
+              <a:rPr lang="cs-CZ"/>
               <a:t>Pátá úroveň</a:t>
             </a:r>
-            <a:endParaRPr lang="cs-CZ"/>
           </a:p>
         </p:txBody>
       </p:sp>
@@ -516,22 +531,21 @@
           <a:lstStyle/>
           <a:p>
             <a:r>
-              <a:rPr lang="cs-CZ" dirty="0" err="1" smtClean="0"/>
+              <a:rPr lang="cs-CZ" dirty="0" err="1"/>
               <a:t>Screenshot</a:t>
             </a:r>
             <a:r>
-              <a:rPr lang="cs-CZ" dirty="0" smtClean="0"/>
+              <a:rPr lang="cs-CZ" dirty="0"/>
               <a:t> mobilní </a:t>
             </a:r>
             <a:r>
-              <a:rPr lang="cs-CZ" dirty="0" err="1" smtClean="0"/>
+              <a:rPr lang="cs-CZ" dirty="0" err="1"/>
               <a:t>app</a:t>
             </a:r>
             <a:r>
-              <a:rPr lang="cs-CZ" dirty="0" smtClean="0"/>
+              <a:rPr lang="cs-CZ" dirty="0"/>
               <a:t>.</a:t>
             </a:r>
-            <a:endParaRPr lang="cs-CZ" dirty="0"/>
           </a:p>
         </p:txBody>
       </p:sp>
@@ -614,21 +628,21 @@
           <a:lstStyle/>
           <a:p>
             <a:r>
-              <a:rPr lang="cs-CZ" dirty="0" err="1" smtClean="0"/>
+              <a:rPr lang="cs-CZ" dirty="0" err="1"/>
               <a:t>Screenshot</a:t>
             </a:r>
             <a:r>
-              <a:rPr lang="cs-CZ" baseline="0" dirty="0" smtClean="0"/>
+              <a:rPr lang="cs-CZ" baseline="0" dirty="0"/>
               <a:t> ze včera </a:t>
             </a:r>
           </a:p>
           <a:p>
             <a:r>
-              <a:rPr lang="cs-CZ" baseline="0" dirty="0" err="1" smtClean="0"/>
+              <a:rPr lang="cs-CZ" baseline="0" dirty="0" err="1"/>
               <a:t>Pokdu</a:t>
             </a:r>
             <a:r>
-              <a:rPr lang="cs-CZ" baseline="0" dirty="0" smtClean="0"/>
+              <a:rPr lang="cs-CZ" baseline="0" dirty="0"/>
               <a:t> se povede tak živá ukázka</a:t>
             </a:r>
             <a:endParaRPr lang="cs-CZ" dirty="0"/>
@@ -715,10 +729,9 @@
           </a:lstStyle>
           <a:p>
             <a:r>
-              <a:rPr lang="cs-CZ" smtClean="0"/>
+              <a:rPr lang="cs-CZ"/>
               <a:t>Klepnutím lze upravit styl předlohy nadpisů.</a:t>
             </a:r>
-            <a:endParaRPr lang="cs-CZ"/>
           </a:p>
         </p:txBody>
       </p:sp>
@@ -834,10 +847,9 @@
           </a:lstStyle>
           <a:p>
             <a:r>
-              <a:rPr lang="cs-CZ" smtClean="0"/>
+              <a:rPr lang="cs-CZ"/>
               <a:t>Klepnutím lze upravit styl předlohy podnadpisů.</a:t>
             </a:r>
-            <a:endParaRPr lang="cs-CZ"/>
           </a:p>
         </p:txBody>
       </p:sp>
@@ -859,7 +871,7 @@
             <a:fld id="{C6F87EC4-DC6A-43AC-A6C7-DEBA23B8D82E}" type="datetimeFigureOut">
               <a:rPr lang="cs-CZ" smtClean="0"/>
               <a:pPr/>
-              <a:t>19.3.2016</a:t>
+              <a:t>24.03.2016</a:t>
             </a:fld>
             <a:endParaRPr lang="cs-CZ"/>
           </a:p>
@@ -949,10 +961,9 @@
           <a:lstStyle/>
           <a:p>
             <a:r>
-              <a:rPr lang="cs-CZ" smtClean="0"/>
+              <a:rPr lang="cs-CZ"/>
               <a:t>Klepnutím lze upravit styl předlohy nadpisů.</a:t>
             </a:r>
-            <a:endParaRPr lang="cs-CZ"/>
           </a:p>
         </p:txBody>
       </p:sp>
@@ -973,38 +984,37 @@
           <a:p>
             <a:pPr lvl="0"/>
             <a:r>
-              <a:rPr lang="cs-CZ" smtClean="0"/>
+              <a:rPr lang="cs-CZ"/>
               <a:t>Klepnutím lze upravit styly předlohy textu.</a:t>
             </a:r>
           </a:p>
           <a:p>
             <a:pPr lvl="1"/>
             <a:r>
-              <a:rPr lang="cs-CZ" smtClean="0"/>
+              <a:rPr lang="cs-CZ"/>
               <a:t>Druhá úroveň</a:t>
             </a:r>
           </a:p>
           <a:p>
             <a:pPr lvl="2"/>
             <a:r>
-              <a:rPr lang="cs-CZ" smtClean="0"/>
+              <a:rPr lang="cs-CZ"/>
               <a:t>Třetí úroveň</a:t>
             </a:r>
           </a:p>
           <a:p>
             <a:pPr lvl="3"/>
             <a:r>
-              <a:rPr lang="cs-CZ" smtClean="0"/>
+              <a:rPr lang="cs-CZ"/>
               <a:t>Čtvrtá úroveň</a:t>
             </a:r>
           </a:p>
           <a:p>
             <a:pPr lvl="4"/>
             <a:r>
-              <a:rPr lang="cs-CZ" smtClean="0"/>
+              <a:rPr lang="cs-CZ"/>
               <a:t>Pátá úroveň</a:t>
             </a:r>
-            <a:endParaRPr lang="cs-CZ"/>
           </a:p>
         </p:txBody>
       </p:sp>
@@ -1026,7 +1036,7 @@
             <a:fld id="{C6F87EC4-DC6A-43AC-A6C7-DEBA23B8D82E}" type="datetimeFigureOut">
               <a:rPr lang="cs-CZ" smtClean="0"/>
               <a:pPr/>
-              <a:t>19.3.2016</a:t>
+              <a:t>24.03.2016</a:t>
             </a:fld>
             <a:endParaRPr lang="cs-CZ"/>
           </a:p>
@@ -1121,10 +1131,9 @@
           <a:lstStyle/>
           <a:p>
             <a:r>
-              <a:rPr lang="cs-CZ" smtClean="0"/>
+              <a:rPr lang="cs-CZ"/>
               <a:t>Klepnutím lze upravit styl předlohy nadpisů.</a:t>
             </a:r>
-            <a:endParaRPr lang="cs-CZ"/>
           </a:p>
         </p:txBody>
       </p:sp>
@@ -1150,38 +1159,37 @@
           <a:p>
             <a:pPr lvl="0"/>
             <a:r>
-              <a:rPr lang="cs-CZ" smtClean="0"/>
+              <a:rPr lang="cs-CZ"/>
               <a:t>Klepnutím lze upravit styly předlohy textu.</a:t>
             </a:r>
           </a:p>
           <a:p>
             <a:pPr lvl="1"/>
             <a:r>
-              <a:rPr lang="cs-CZ" smtClean="0"/>
+              <a:rPr lang="cs-CZ"/>
               <a:t>Druhá úroveň</a:t>
             </a:r>
           </a:p>
           <a:p>
             <a:pPr lvl="2"/>
             <a:r>
-              <a:rPr lang="cs-CZ" smtClean="0"/>
+              <a:rPr lang="cs-CZ"/>
               <a:t>Třetí úroveň</a:t>
             </a:r>
           </a:p>
           <a:p>
             <a:pPr lvl="3"/>
             <a:r>
-              <a:rPr lang="cs-CZ" smtClean="0"/>
+              <a:rPr lang="cs-CZ"/>
               <a:t>Čtvrtá úroveň</a:t>
             </a:r>
           </a:p>
           <a:p>
             <a:pPr lvl="4"/>
             <a:r>
-              <a:rPr lang="cs-CZ" smtClean="0"/>
+              <a:rPr lang="cs-CZ"/>
               <a:t>Pátá úroveň</a:t>
             </a:r>
-            <a:endParaRPr lang="cs-CZ"/>
           </a:p>
         </p:txBody>
       </p:sp>
@@ -1203,7 +1211,7 @@
             <a:fld id="{C6F87EC4-DC6A-43AC-A6C7-DEBA23B8D82E}" type="datetimeFigureOut">
               <a:rPr lang="cs-CZ" smtClean="0"/>
               <a:pPr/>
-              <a:t>19.3.2016</a:t>
+              <a:t>24.03.2016</a:t>
             </a:fld>
             <a:endParaRPr lang="cs-CZ"/>
           </a:p>
@@ -1308,10 +1316,9 @@
           </a:lstStyle>
           <a:p>
             <a:r>
-              <a:rPr lang="cs-CZ" dirty="0" smtClean="0"/>
+              <a:rPr lang="cs-CZ" dirty="0"/>
               <a:t>Klepnutím lze upravit styl předlohy nadpisů.</a:t>
             </a:r>
-            <a:endParaRPr lang="cs-CZ" dirty="0"/>
           </a:p>
         </p:txBody>
       </p:sp>
@@ -1332,38 +1339,37 @@
           <a:p>
             <a:pPr lvl="0"/>
             <a:r>
-              <a:rPr lang="cs-CZ" smtClean="0"/>
+              <a:rPr lang="cs-CZ"/>
               <a:t>Klepnutím lze upravit styly předlohy textu.</a:t>
             </a:r>
           </a:p>
           <a:p>
             <a:pPr lvl="1"/>
             <a:r>
-              <a:rPr lang="cs-CZ" smtClean="0"/>
+              <a:rPr lang="cs-CZ"/>
               <a:t>Druhá úroveň</a:t>
             </a:r>
           </a:p>
           <a:p>
             <a:pPr lvl="2"/>
             <a:r>
-              <a:rPr lang="cs-CZ" smtClean="0"/>
+              <a:rPr lang="cs-CZ"/>
               <a:t>Třetí úroveň</a:t>
             </a:r>
           </a:p>
           <a:p>
             <a:pPr lvl="3"/>
             <a:r>
-              <a:rPr lang="cs-CZ" smtClean="0"/>
+              <a:rPr lang="cs-CZ"/>
               <a:t>Čtvrtá úroveň</a:t>
             </a:r>
           </a:p>
           <a:p>
             <a:pPr lvl="4"/>
             <a:r>
-              <a:rPr lang="cs-CZ" smtClean="0"/>
+              <a:rPr lang="cs-CZ"/>
               <a:t>Pátá úroveň</a:t>
             </a:r>
-            <a:endParaRPr lang="cs-CZ"/>
           </a:p>
         </p:txBody>
       </p:sp>
@@ -1385,7 +1391,7 @@
             <a:fld id="{C6F87EC4-DC6A-43AC-A6C7-DEBA23B8D82E}" type="datetimeFigureOut">
               <a:rPr lang="cs-CZ" smtClean="0"/>
               <a:pPr/>
-              <a:t>19.3.2016</a:t>
+              <a:t>24.03.2016</a:t>
             </a:fld>
             <a:endParaRPr lang="cs-CZ"/>
           </a:p>
@@ -1503,10 +1509,9 @@
           </a:lstStyle>
           <a:p>
             <a:r>
-              <a:rPr lang="cs-CZ" dirty="0" smtClean="0"/>
+              <a:rPr lang="cs-CZ" dirty="0"/>
               <a:t>Klepnutím lze upravit styl předlohy nadpisů.</a:t>
             </a:r>
-            <a:endParaRPr lang="cs-CZ" dirty="0"/>
           </a:p>
         </p:txBody>
       </p:sp>
@@ -1621,7 +1626,7 @@
           <a:p>
             <a:pPr lvl="0"/>
             <a:r>
-              <a:rPr lang="cs-CZ" smtClean="0"/>
+              <a:rPr lang="cs-CZ"/>
               <a:t>Klepnutím lze upravit styly předlohy textu.</a:t>
             </a:r>
           </a:p>
@@ -1645,7 +1650,7 @@
             <a:fld id="{C6F87EC4-DC6A-43AC-A6C7-DEBA23B8D82E}" type="datetimeFigureOut">
               <a:rPr lang="cs-CZ" smtClean="0"/>
               <a:pPr/>
-              <a:t>19.3.2016</a:t>
+              <a:t>24.03.2016</a:t>
             </a:fld>
             <a:endParaRPr lang="cs-CZ"/>
           </a:p>
@@ -1740,10 +1745,9 @@
           <a:lstStyle/>
           <a:p>
             <a:r>
-              <a:rPr lang="cs-CZ" dirty="0" smtClean="0"/>
+              <a:rPr lang="cs-CZ" dirty="0"/>
               <a:t>Klepnutím lze upravit styl předlohy nadpisů.</a:t>
             </a:r>
-            <a:endParaRPr lang="cs-CZ" dirty="0"/>
           </a:p>
         </p:txBody>
       </p:sp>
@@ -1797,38 +1801,37 @@
           <a:p>
             <a:pPr lvl="0"/>
             <a:r>
-              <a:rPr lang="cs-CZ" smtClean="0"/>
+              <a:rPr lang="cs-CZ"/>
               <a:t>Klepnutím lze upravit styly předlohy textu.</a:t>
             </a:r>
           </a:p>
           <a:p>
             <a:pPr lvl="1"/>
             <a:r>
-              <a:rPr lang="cs-CZ" smtClean="0"/>
+              <a:rPr lang="cs-CZ"/>
               <a:t>Druhá úroveň</a:t>
             </a:r>
           </a:p>
           <a:p>
             <a:pPr lvl="2"/>
             <a:r>
-              <a:rPr lang="cs-CZ" smtClean="0"/>
+              <a:rPr lang="cs-CZ"/>
               <a:t>Třetí úroveň</a:t>
             </a:r>
           </a:p>
           <a:p>
             <a:pPr lvl="3"/>
             <a:r>
-              <a:rPr lang="cs-CZ" smtClean="0"/>
+              <a:rPr lang="cs-CZ"/>
               <a:t>Čtvrtá úroveň</a:t>
             </a:r>
           </a:p>
           <a:p>
             <a:pPr lvl="4"/>
             <a:r>
-              <a:rPr lang="cs-CZ" smtClean="0"/>
+              <a:rPr lang="cs-CZ"/>
               <a:t>Pátá úroveň</a:t>
             </a:r>
-            <a:endParaRPr lang="cs-CZ"/>
           </a:p>
         </p:txBody>
       </p:sp>
@@ -1882,38 +1885,37 @@
           <a:p>
             <a:pPr lvl="0"/>
             <a:r>
-              <a:rPr lang="cs-CZ" smtClean="0"/>
+              <a:rPr lang="cs-CZ"/>
               <a:t>Klepnutím lze upravit styly předlohy textu.</a:t>
             </a:r>
           </a:p>
           <a:p>
             <a:pPr lvl="1"/>
             <a:r>
-              <a:rPr lang="cs-CZ" smtClean="0"/>
+              <a:rPr lang="cs-CZ"/>
               <a:t>Druhá úroveň</a:t>
             </a:r>
           </a:p>
           <a:p>
             <a:pPr lvl="2"/>
             <a:r>
-              <a:rPr lang="cs-CZ" smtClean="0"/>
+              <a:rPr lang="cs-CZ"/>
               <a:t>Třetí úroveň</a:t>
             </a:r>
           </a:p>
           <a:p>
             <a:pPr lvl="3"/>
             <a:r>
-              <a:rPr lang="cs-CZ" smtClean="0"/>
+              <a:rPr lang="cs-CZ"/>
               <a:t>Čtvrtá úroveň</a:t>
             </a:r>
           </a:p>
           <a:p>
             <a:pPr lvl="4"/>
             <a:r>
-              <a:rPr lang="cs-CZ" smtClean="0"/>
+              <a:rPr lang="cs-CZ"/>
               <a:t>Pátá úroveň</a:t>
             </a:r>
-            <a:endParaRPr lang="cs-CZ"/>
           </a:p>
         </p:txBody>
       </p:sp>
@@ -1935,7 +1937,7 @@
             <a:fld id="{C6F87EC4-DC6A-43AC-A6C7-DEBA23B8D82E}" type="datetimeFigureOut">
               <a:rPr lang="cs-CZ" smtClean="0"/>
               <a:pPr/>
-              <a:t>19.3.2016</a:t>
+              <a:t>24.03.2016</a:t>
             </a:fld>
             <a:endParaRPr lang="cs-CZ"/>
           </a:p>
@@ -2029,10 +2031,9 @@
           </a:lstStyle>
           <a:p>
             <a:r>
-              <a:rPr lang="cs-CZ" smtClean="0"/>
+              <a:rPr lang="cs-CZ"/>
               <a:t>Klepnutím lze upravit styl předlohy nadpisů.</a:t>
             </a:r>
-            <a:endParaRPr lang="cs-CZ"/>
           </a:p>
         </p:txBody>
       </p:sp>
@@ -2095,7 +2096,7 @@
           <a:p>
             <a:pPr lvl="0"/>
             <a:r>
-              <a:rPr lang="cs-CZ" smtClean="0"/>
+              <a:rPr lang="cs-CZ"/>
               <a:t>Klepnutím lze upravit styly předlohy textu.</a:t>
             </a:r>
           </a:p>
@@ -2151,38 +2152,37 @@
           <a:p>
             <a:pPr lvl="0"/>
             <a:r>
-              <a:rPr lang="cs-CZ" smtClean="0"/>
+              <a:rPr lang="cs-CZ"/>
               <a:t>Klepnutím lze upravit styly předlohy textu.</a:t>
             </a:r>
           </a:p>
           <a:p>
             <a:pPr lvl="1"/>
             <a:r>
-              <a:rPr lang="cs-CZ" smtClean="0"/>
+              <a:rPr lang="cs-CZ"/>
               <a:t>Druhá úroveň</a:t>
             </a:r>
           </a:p>
           <a:p>
             <a:pPr lvl="2"/>
             <a:r>
-              <a:rPr lang="cs-CZ" smtClean="0"/>
+              <a:rPr lang="cs-CZ"/>
               <a:t>Třetí úroveň</a:t>
             </a:r>
           </a:p>
           <a:p>
             <a:pPr lvl="3"/>
             <a:r>
-              <a:rPr lang="cs-CZ" smtClean="0"/>
+              <a:rPr lang="cs-CZ"/>
               <a:t>Čtvrtá úroveň</a:t>
             </a:r>
           </a:p>
           <a:p>
             <a:pPr lvl="4"/>
             <a:r>
-              <a:rPr lang="cs-CZ" smtClean="0"/>
+              <a:rPr lang="cs-CZ"/>
               <a:t>Pátá úroveň</a:t>
             </a:r>
-            <a:endParaRPr lang="cs-CZ"/>
           </a:p>
         </p:txBody>
       </p:sp>
@@ -2245,7 +2245,7 @@
           <a:p>
             <a:pPr lvl="0"/>
             <a:r>
-              <a:rPr lang="cs-CZ" smtClean="0"/>
+              <a:rPr lang="cs-CZ"/>
               <a:t>Klepnutím lze upravit styly předlohy textu.</a:t>
             </a:r>
           </a:p>
@@ -2301,38 +2301,37 @@
           <a:p>
             <a:pPr lvl="0"/>
             <a:r>
-              <a:rPr lang="cs-CZ" smtClean="0"/>
+              <a:rPr lang="cs-CZ"/>
               <a:t>Klepnutím lze upravit styly předlohy textu.</a:t>
             </a:r>
           </a:p>
           <a:p>
             <a:pPr lvl="1"/>
             <a:r>
-              <a:rPr lang="cs-CZ" smtClean="0"/>
+              <a:rPr lang="cs-CZ"/>
               <a:t>Druhá úroveň</a:t>
             </a:r>
           </a:p>
           <a:p>
             <a:pPr lvl="2"/>
             <a:r>
-              <a:rPr lang="cs-CZ" smtClean="0"/>
+              <a:rPr lang="cs-CZ"/>
               <a:t>Třetí úroveň</a:t>
             </a:r>
           </a:p>
           <a:p>
             <a:pPr lvl="3"/>
             <a:r>
-              <a:rPr lang="cs-CZ" smtClean="0"/>
+              <a:rPr lang="cs-CZ"/>
               <a:t>Čtvrtá úroveň</a:t>
             </a:r>
           </a:p>
           <a:p>
             <a:pPr lvl="4"/>
             <a:r>
-              <a:rPr lang="cs-CZ" smtClean="0"/>
+              <a:rPr lang="cs-CZ"/>
               <a:t>Pátá úroveň</a:t>
             </a:r>
-            <a:endParaRPr lang="cs-CZ"/>
           </a:p>
         </p:txBody>
       </p:sp>
@@ -2354,7 +2353,7 @@
             <a:fld id="{C6F87EC4-DC6A-43AC-A6C7-DEBA23B8D82E}" type="datetimeFigureOut">
               <a:rPr lang="cs-CZ" smtClean="0"/>
               <a:pPr/>
-              <a:t>19.3.2016</a:t>
+              <a:t>24.03.2016</a:t>
             </a:fld>
             <a:endParaRPr lang="cs-CZ"/>
           </a:p>
@@ -2444,10 +2443,9 @@
           <a:lstStyle/>
           <a:p>
             <a:r>
-              <a:rPr lang="cs-CZ" smtClean="0"/>
+              <a:rPr lang="cs-CZ"/>
               <a:t>Klepnutím lze upravit styl předlohy nadpisů.</a:t>
             </a:r>
-            <a:endParaRPr lang="cs-CZ"/>
           </a:p>
         </p:txBody>
       </p:sp>
@@ -2469,7 +2467,7 @@
             <a:fld id="{C6F87EC4-DC6A-43AC-A6C7-DEBA23B8D82E}" type="datetimeFigureOut">
               <a:rPr lang="cs-CZ" smtClean="0"/>
               <a:pPr/>
-              <a:t>19.3.2016</a:t>
+              <a:t>24.03.2016</a:t>
             </a:fld>
             <a:endParaRPr lang="cs-CZ"/>
           </a:p>
@@ -2561,7 +2559,7 @@
             <a:fld id="{C6F87EC4-DC6A-43AC-A6C7-DEBA23B8D82E}" type="datetimeFigureOut">
               <a:rPr lang="cs-CZ" smtClean="0"/>
               <a:pPr/>
-              <a:t>19.3.2016</a:t>
+              <a:t>24.03.2016</a:t>
             </a:fld>
             <a:endParaRPr lang="cs-CZ"/>
           </a:p>
@@ -2660,10 +2658,9 @@
           </a:lstStyle>
           <a:p>
             <a:r>
-              <a:rPr lang="cs-CZ" smtClean="0"/>
+              <a:rPr lang="cs-CZ"/>
               <a:t>Klepnutím lze upravit styl předlohy nadpisů.</a:t>
             </a:r>
-            <a:endParaRPr lang="cs-CZ"/>
           </a:p>
         </p:txBody>
       </p:sp>
@@ -2717,38 +2714,37 @@
           <a:p>
             <a:pPr lvl="0"/>
             <a:r>
-              <a:rPr lang="cs-CZ" smtClean="0"/>
+              <a:rPr lang="cs-CZ"/>
               <a:t>Klepnutím lze upravit styly předlohy textu.</a:t>
             </a:r>
           </a:p>
           <a:p>
             <a:pPr lvl="1"/>
             <a:r>
-              <a:rPr lang="cs-CZ" smtClean="0"/>
+              <a:rPr lang="cs-CZ"/>
               <a:t>Druhá úroveň</a:t>
             </a:r>
           </a:p>
           <a:p>
             <a:pPr lvl="2"/>
             <a:r>
-              <a:rPr lang="cs-CZ" smtClean="0"/>
+              <a:rPr lang="cs-CZ"/>
               <a:t>Třetí úroveň</a:t>
             </a:r>
           </a:p>
           <a:p>
             <a:pPr lvl="3"/>
             <a:r>
-              <a:rPr lang="cs-CZ" smtClean="0"/>
+              <a:rPr lang="cs-CZ"/>
               <a:t>Čtvrtá úroveň</a:t>
             </a:r>
           </a:p>
           <a:p>
             <a:pPr lvl="4"/>
             <a:r>
-              <a:rPr lang="cs-CZ" smtClean="0"/>
+              <a:rPr lang="cs-CZ"/>
               <a:t>Pátá úroveň</a:t>
             </a:r>
-            <a:endParaRPr lang="cs-CZ"/>
           </a:p>
         </p:txBody>
       </p:sp>
@@ -2811,7 +2807,7 @@
           <a:p>
             <a:pPr lvl="0"/>
             <a:r>
-              <a:rPr lang="cs-CZ" smtClean="0"/>
+              <a:rPr lang="cs-CZ"/>
               <a:t>Klepnutím lze upravit styly předlohy textu.</a:t>
             </a:r>
           </a:p>
@@ -2835,7 +2831,7 @@
             <a:fld id="{C6F87EC4-DC6A-43AC-A6C7-DEBA23B8D82E}" type="datetimeFigureOut">
               <a:rPr lang="cs-CZ" smtClean="0"/>
               <a:pPr/>
-              <a:t>19.3.2016</a:t>
+              <a:t>24.03.2016</a:t>
             </a:fld>
             <a:endParaRPr lang="cs-CZ"/>
           </a:p>
@@ -2934,10 +2930,9 @@
           </a:lstStyle>
           <a:p>
             <a:r>
-              <a:rPr lang="cs-CZ" smtClean="0"/>
+              <a:rPr lang="cs-CZ"/>
               <a:t>Klepnutím lze upravit styl předlohy nadpisů.</a:t>
             </a:r>
-            <a:endParaRPr lang="cs-CZ"/>
           </a:p>
         </p:txBody>
       </p:sp>
@@ -3061,7 +3056,7 @@
           <a:p>
             <a:pPr lvl="0"/>
             <a:r>
-              <a:rPr lang="cs-CZ" smtClean="0"/>
+              <a:rPr lang="cs-CZ"/>
               <a:t>Klepnutím lze upravit styly předlohy textu.</a:t>
             </a:r>
           </a:p>
@@ -3085,7 +3080,7 @@
             <a:fld id="{C6F87EC4-DC6A-43AC-A6C7-DEBA23B8D82E}" type="datetimeFigureOut">
               <a:rPr lang="cs-CZ" smtClean="0"/>
               <a:pPr/>
-              <a:t>19.3.2016</a:t>
+              <a:t>24.03.2016</a:t>
             </a:fld>
             <a:endParaRPr lang="cs-CZ"/>
           </a:p>
@@ -3190,10 +3185,9 @@
           <a:lstStyle/>
           <a:p>
             <a:r>
-              <a:rPr lang="cs-CZ" smtClean="0"/>
+              <a:rPr lang="cs-CZ"/>
               <a:t>Klepnutím lze upravit styl předlohy nadpisů.</a:t>
             </a:r>
-            <a:endParaRPr lang="cs-CZ"/>
           </a:p>
         </p:txBody>
       </p:sp>
@@ -3224,38 +3218,37 @@
           <a:p>
             <a:pPr lvl="0"/>
             <a:r>
-              <a:rPr lang="cs-CZ" smtClean="0"/>
+              <a:rPr lang="cs-CZ"/>
               <a:t>Klepnutím lze upravit styly předlohy textu.</a:t>
             </a:r>
           </a:p>
           <a:p>
             <a:pPr lvl="1"/>
             <a:r>
-              <a:rPr lang="cs-CZ" smtClean="0"/>
+              <a:rPr lang="cs-CZ"/>
               <a:t>Druhá úroveň</a:t>
             </a:r>
           </a:p>
           <a:p>
             <a:pPr lvl="2"/>
             <a:r>
-              <a:rPr lang="cs-CZ" smtClean="0"/>
+              <a:rPr lang="cs-CZ"/>
               <a:t>Třetí úroveň</a:t>
             </a:r>
           </a:p>
           <a:p>
             <a:pPr lvl="3"/>
             <a:r>
-              <a:rPr lang="cs-CZ" smtClean="0"/>
+              <a:rPr lang="cs-CZ"/>
               <a:t>Čtvrtá úroveň</a:t>
             </a:r>
           </a:p>
           <a:p>
             <a:pPr lvl="4"/>
             <a:r>
-              <a:rPr lang="cs-CZ" smtClean="0"/>
+              <a:rPr lang="cs-CZ"/>
               <a:t>Pátá úroveň</a:t>
             </a:r>
-            <a:endParaRPr lang="cs-CZ"/>
           </a:p>
         </p:txBody>
       </p:sp>
@@ -3295,7 +3288,7 @@
             <a:fld id="{C6F87EC4-DC6A-43AC-A6C7-DEBA23B8D82E}" type="datetimeFigureOut">
               <a:rPr lang="cs-CZ" smtClean="0"/>
               <a:pPr/>
-              <a:t>19.3.2016</a:t>
+              <a:t>24.03.2016</a:t>
             </a:fld>
             <a:endParaRPr lang="cs-CZ"/>
           </a:p>
@@ -3733,7 +3726,7 @@
               <a:defRPr/>
             </a:pPr>
             <a:r>
-              <a:rPr kumimoji="0" lang="cs-CZ" sz="2000" b="1" i="0" u="none" strike="noStrike" kern="1200" cap="none" spc="0" normalizeH="0" baseline="0" noProof="0" dirty="0" smtClean="0">
+              <a:rPr kumimoji="0" lang="cs-CZ" sz="2000" b="1" i="0" u="none" strike="noStrike" kern="1200" cap="none" spc="0" normalizeH="0" baseline="0" noProof="0" dirty="0">
                 <a:ln>
                   <a:noFill/>
                 </a:ln>
@@ -3750,14 +3743,14 @@
               <a:t>Petr I., Petr II., Jirka, Zbyněk</a:t>
             </a:r>
             <a:r>
-              <a:rPr lang="cs-CZ" sz="2000" b="1" dirty="0" smtClean="0">
+              <a:rPr lang="cs-CZ" sz="2000" b="1" dirty="0">
                 <a:solidFill>
                   <a:schemeClr val="bg1"/>
                 </a:solidFill>
               </a:rPr>
               <a:t>, Adam</a:t>
             </a:r>
-            <a:endParaRPr kumimoji="0" lang="cs-CZ" sz="2000" b="1" i="0" u="none" strike="noStrike" kern="1200" cap="none" spc="0" normalizeH="0" baseline="0" noProof="0" dirty="0" smtClean="0">
+            <a:endParaRPr kumimoji="0" lang="cs-CZ" sz="2000" b="1" i="0" u="none" strike="noStrike" kern="1200" cap="none" spc="0" normalizeH="0" baseline="0" noProof="0" dirty="0">
               <a:ln>
                 <a:noFill/>
               </a:ln>
@@ -3848,7 +3841,7 @@
           <a:lstStyle/>
           <a:p>
             <a:r>
-              <a:rPr lang="cs-CZ" b="1" dirty="0" err="1" smtClean="0">
+              <a:rPr lang="cs-CZ" b="1" dirty="0" err="1">
                 <a:effectLst>
                   <a:outerShdw blurRad="38100" dist="38100" dir="2700000" algn="tl">
                     <a:srgbClr val="000000">
@@ -3912,7 +3905,7 @@
               <a:defRPr/>
             </a:pPr>
             <a:r>
-              <a:rPr kumimoji="0" lang="cs-CZ" sz="2400" b="0" i="0" u="none" strike="noStrike" kern="1200" cap="none" spc="0" normalizeH="0" baseline="0" noProof="0" smtClean="0">
+              <a:rPr kumimoji="0" lang="cs-CZ" sz="2400" b="0" i="0" u="none" strike="noStrike" kern="1200" cap="none" spc="0" normalizeH="0" baseline="0" noProof="0">
                 <a:ln>
                   <a:noFill/>
                 </a:ln>
@@ -3931,7 +3924,7 @@
               </a:rPr>
               <a:t>Včasné varování záplav</a:t>
             </a:r>
-            <a:endParaRPr kumimoji="0" lang="cs-CZ" sz="2400" b="0" i="0" u="none" strike="noStrike" kern="1200" cap="none" spc="0" normalizeH="0" baseline="0" noProof="0" dirty="0" smtClean="0">
+            <a:endParaRPr kumimoji="0" lang="cs-CZ" sz="2400" b="0" i="0" u="none" strike="noStrike" kern="1200" cap="none" spc="0" normalizeH="0" baseline="0" noProof="0" dirty="0">
               <a:ln>
                 <a:noFill/>
               </a:ln>
@@ -3982,13 +3975,6 @@
   <p:clrMapOvr>
     <a:masterClrMapping/>
   </p:clrMapOvr>
-  <p:timing>
-    <p:tnLst>
-      <p:par>
-        <p:cTn id="1" dur="indefinite" restart="never" nodeType="tmRoot"/>
-      </p:par>
-    </p:tnLst>
-  </p:timing>
 </p:sld>
 </file>
 
@@ -4027,69 +4013,68 @@
           <a:lstStyle/>
           <a:p>
             <a:r>
-              <a:rPr lang="cs-CZ" dirty="0" smtClean="0"/>
+              <a:rPr lang="cs-CZ" dirty="0"/>
               <a:t>Perličky</a:t>
             </a:r>
+          </a:p>
+        </p:txBody>
+      </p:sp>
+      <p:sp>
+        <p:nvSpPr>
+          <p:cNvPr id="3" name="Zástupný symbol pro obsah 2"/>
+          <p:cNvSpPr>
+            <a:spLocks noGrp="1"/>
+          </p:cNvSpPr>
+          <p:nvPr>
+            <p:ph idx="1"/>
+          </p:nvPr>
+        </p:nvSpPr>
+        <p:spPr/>
+        <p:txBody>
+          <a:bodyPr/>
+          <a:lstStyle/>
+          <a:p>
+            <a:r>
+              <a:rPr lang="cs-CZ" dirty="0" err="1"/>
+              <a:t>Stream</a:t>
+            </a:r>
+            <a:r>
+              <a:rPr lang="cs-CZ" dirty="0"/>
+              <a:t> </a:t>
+            </a:r>
+            <a:r>
+              <a:rPr lang="cs-CZ" dirty="0" err="1"/>
+              <a:t>analytics</a:t>
+            </a:r>
             <a:endParaRPr lang="cs-CZ" dirty="0"/>
           </a:p>
-        </p:txBody>
-      </p:sp>
-      <p:sp>
-        <p:nvSpPr>
-          <p:cNvPr id="3" name="Zástupný symbol pro obsah 2"/>
-          <p:cNvSpPr>
-            <a:spLocks noGrp="1"/>
-          </p:cNvSpPr>
-          <p:nvPr>
-            <p:ph idx="1"/>
-          </p:nvPr>
-        </p:nvSpPr>
-        <p:spPr/>
-        <p:txBody>
-          <a:bodyPr/>
-          <a:lstStyle/>
-          <a:p>
-            <a:r>
-              <a:rPr lang="cs-CZ" dirty="0" err="1" smtClean="0"/>
-              <a:t>Stream</a:t>
-            </a:r>
-            <a:r>
-              <a:rPr lang="cs-CZ" dirty="0" smtClean="0"/>
+          <a:p>
+            <a:r>
+              <a:rPr lang="cs-CZ" dirty="0" err="1"/>
+              <a:t>Power</a:t>
+            </a:r>
+            <a:r>
+              <a:rPr lang="cs-CZ" dirty="0"/>
               <a:t> </a:t>
             </a:r>
             <a:r>
-              <a:rPr lang="cs-CZ" dirty="0" err="1" smtClean="0"/>
-              <a:t>analytics</a:t>
-            </a:r>
-            <a:endParaRPr lang="cs-CZ" dirty="0" smtClean="0"/>
-          </a:p>
-          <a:p>
-            <a:r>
-              <a:rPr lang="cs-CZ" dirty="0" err="1" smtClean="0"/>
-              <a:t>Power</a:t>
-            </a:r>
-            <a:r>
-              <a:rPr lang="cs-CZ" dirty="0" smtClean="0"/>
-              <a:t> </a:t>
-            </a:r>
-            <a:r>
-              <a:rPr lang="cs-CZ" dirty="0" err="1" smtClean="0"/>
+              <a:rPr lang="cs-CZ" dirty="0" err="1"/>
               <a:t>Bi</a:t>
             </a:r>
-            <a:endParaRPr lang="cs-CZ" dirty="0" smtClean="0"/>
-          </a:p>
-          <a:p>
-            <a:r>
-              <a:rPr lang="cs-CZ" dirty="0" err="1" smtClean="0"/>
+            <a:endParaRPr lang="cs-CZ" dirty="0"/>
+          </a:p>
+          <a:p>
+            <a:r>
+              <a:rPr lang="cs-CZ" dirty="0" err="1"/>
               <a:t>SoftSerial</a:t>
             </a:r>
             <a:r>
-              <a:rPr lang="cs-CZ" dirty="0" smtClean="0"/>
+              <a:rPr lang="cs-CZ" dirty="0"/>
               <a:t> a AT \r\n</a:t>
             </a:r>
           </a:p>
           <a:p>
-            <a:endParaRPr lang="cs-CZ" dirty="0" smtClean="0"/>
+            <a:endParaRPr lang="cs-CZ" dirty="0"/>
           </a:p>
         </p:txBody>
       </p:sp>
@@ -4137,10 +4122,9 @@
           <a:lstStyle/>
           <a:p>
             <a:r>
-              <a:rPr lang="cs-CZ" dirty="0" smtClean="0"/>
+              <a:rPr lang="cs-CZ" dirty="0"/>
               <a:t>Dotazy?</a:t>
             </a:r>
-            <a:endParaRPr lang="cs-CZ" dirty="0"/>
           </a:p>
         </p:txBody>
       </p:sp>
@@ -4160,18 +4144,13 @@
           <a:lstStyle/>
           <a:p>
             <a:r>
-              <a:rPr lang="cs-CZ" dirty="0" smtClean="0">
+              <a:rPr lang="cs-CZ" dirty="0">
                 <a:solidFill>
                   <a:schemeClr val="bg1"/>
                 </a:solidFill>
               </a:rPr>
               <a:t>Děkujeme za pozornost.</a:t>
             </a:r>
-            <a:endParaRPr lang="cs-CZ" dirty="0">
-              <a:solidFill>
-                <a:schemeClr val="bg1"/>
-              </a:solidFill>
-            </a:endParaRPr>
           </a:p>
         </p:txBody>
       </p:sp>
@@ -4218,10 +4197,9 @@
           <a:lstStyle/>
           <a:p>
             <a:r>
-              <a:rPr lang="cs-CZ" dirty="0" smtClean="0"/>
+              <a:rPr lang="cs-CZ" dirty="0"/>
               <a:t>Cíl</a:t>
             </a:r>
-            <a:endParaRPr lang="cs-CZ" dirty="0"/>
           </a:p>
         </p:txBody>
       </p:sp>
@@ -4241,27 +4219,19 @@
           <a:lstStyle/>
           <a:p>
             <a:r>
-              <a:rPr lang="cs-CZ" dirty="0" smtClean="0"/>
+              <a:rPr lang="cs-CZ" dirty="0"/>
               <a:t>Monitoring výšky hladiny řeky =&gt; průtok</a:t>
             </a:r>
           </a:p>
           <a:p>
             <a:r>
-              <a:rPr lang="cs-CZ" dirty="0" smtClean="0"/>
-              <a:t>Centrální </a:t>
-            </a:r>
-            <a:r>
               <a:rPr lang="cs-CZ" dirty="0"/>
-              <a:t>s</a:t>
-            </a:r>
-            <a:r>
-              <a:rPr lang="cs-CZ" dirty="0" smtClean="0"/>
-              <a:t>běr aktuálních hodnot</a:t>
-            </a:r>
-          </a:p>
-          <a:p>
-            <a:r>
-              <a:rPr lang="cs-CZ" dirty="0" smtClean="0"/>
+              <a:t>Centrální sběr aktuálních hodnot</a:t>
+            </a:r>
+          </a:p>
+          <a:p>
+            <a:r>
+              <a:rPr lang="cs-CZ" dirty="0"/>
               <a:t>Vyhodnocení rizika</a:t>
             </a:r>
           </a:p>
@@ -4275,13 +4245,6 @@
   <p:clrMapOvr>
     <a:masterClrMapping/>
   </p:clrMapOvr>
-  <p:timing>
-    <p:tnLst>
-      <p:par>
-        <p:cTn id="1" dur="indefinite" restart="never" nodeType="tmRoot"/>
-      </p:par>
-    </p:tnLst>
-  </p:timing>
 </p:sld>
 </file>
 
@@ -4318,10 +4281,9 @@
           <a:lstStyle/>
           <a:p>
             <a:r>
-              <a:rPr lang="cs-CZ" dirty="0" smtClean="0"/>
+              <a:rPr lang="cs-CZ" dirty="0"/>
               <a:t>Řešení</a:t>
             </a:r>
-            <a:endParaRPr lang="cs-CZ" dirty="0"/>
           </a:p>
         </p:txBody>
       </p:sp>
@@ -4341,10 +4303,9 @@
           <a:lstStyle/>
           <a:p>
             <a:r>
-              <a:rPr lang="cs-CZ" dirty="0" smtClean="0"/>
+              <a:rPr lang="cs-CZ" dirty="0"/>
               <a:t>Naše</a:t>
             </a:r>
-            <a:endParaRPr lang="cs-CZ" dirty="0"/>
           </a:p>
         </p:txBody>
       </p:sp>
@@ -4563,8 +4524,8 @@
         </p:nvCxnSpPr>
         <p:spPr>
           <a:xfrm flipV="1">
-            <a:off x="1835696" y="1916832"/>
-            <a:ext cx="936104" cy="936104"/>
+            <a:off x="1835696" y="2060848"/>
+            <a:ext cx="576064" cy="792088"/>
           </a:xfrm>
           <a:prstGeom prst="straightConnector1">
             <a:avLst/>
@@ -4946,7 +4907,7 @@
           <a:p>
             <a:pPr algn="ctr"/>
             <a:r>
-              <a:rPr lang="cs-CZ" dirty="0" smtClean="0">
+              <a:rPr lang="cs-CZ" dirty="0">
                 <a:solidFill>
                   <a:schemeClr val="tx1">
                     <a:lumMod val="50000"/>
@@ -4957,7 +4918,7 @@
               <a:t>Table </a:t>
             </a:r>
             <a:r>
-              <a:rPr lang="cs-CZ" dirty="0" err="1" smtClean="0">
+              <a:rPr lang="cs-CZ" dirty="0" err="1">
                 <a:solidFill>
                   <a:schemeClr val="tx1">
                     <a:lumMod val="50000"/>
@@ -4968,7 +4929,7 @@
               <a:t>stor</a:t>
             </a:r>
             <a:r>
-              <a:rPr lang="cs-CZ" dirty="0" smtClean="0">
+              <a:rPr lang="cs-CZ" dirty="0">
                 <a:solidFill>
                   <a:schemeClr val="tx1">
                     <a:lumMod val="50000"/>
@@ -4978,14 +4939,6 @@
               </a:rPr>
               <a:t>.</a:t>
             </a:r>
-            <a:endParaRPr lang="cs-CZ" dirty="0">
-              <a:solidFill>
-                <a:schemeClr val="tx1">
-                  <a:lumMod val="50000"/>
-                  <a:lumOff val="50000"/>
-                </a:schemeClr>
-              </a:solidFill>
-            </a:endParaRPr>
           </a:p>
         </p:txBody>
       </p:sp>
@@ -5135,18 +5088,13 @@
           <a:lstStyle/>
           <a:p>
             <a:r>
-              <a:rPr lang="cs-CZ" b="1" dirty="0" smtClean="0">
+              <a:rPr lang="cs-CZ" b="1" dirty="0">
                 <a:solidFill>
                   <a:srgbClr val="0070C0"/>
                 </a:solidFill>
               </a:rPr>
               <a:t>HW</a:t>
             </a:r>
-            <a:endParaRPr lang="cs-CZ" b="1" dirty="0">
-              <a:solidFill>
-                <a:srgbClr val="0070C0"/>
-              </a:solidFill>
-            </a:endParaRPr>
           </a:p>
         </p:txBody>
       </p:sp>
@@ -5168,39 +5116,33 @@
           <a:lstStyle/>
           <a:p>
             <a:r>
-              <a:rPr lang="cs-CZ" dirty="0" smtClean="0"/>
+              <a:rPr lang="cs-CZ" dirty="0"/>
               <a:t>Sonar</a:t>
             </a:r>
           </a:p>
           <a:p>
             <a:r>
-              <a:rPr lang="cs-CZ" dirty="0" err="1" smtClean="0"/>
+              <a:rPr lang="cs-CZ" dirty="0" err="1"/>
               <a:t>Arduino</a:t>
             </a:r>
-            <a:endParaRPr lang="cs-CZ" dirty="0" smtClean="0"/>
-          </a:p>
-          <a:p>
-            <a:r>
-              <a:rPr lang="cs-CZ" dirty="0" err="1" smtClean="0"/>
+            <a:endParaRPr lang="cs-CZ" dirty="0"/>
+          </a:p>
+          <a:p>
+            <a:r>
+              <a:rPr lang="cs-CZ" dirty="0" err="1"/>
               <a:t>SigFox</a:t>
             </a:r>
-            <a:endParaRPr lang="cs-CZ" dirty="0" smtClean="0"/>
-          </a:p>
-          <a:p>
-            <a:r>
-              <a:rPr lang="cs-CZ" dirty="0" err="1" smtClean="0"/>
+            <a:endParaRPr lang="cs-CZ" dirty="0"/>
+          </a:p>
+          <a:p>
+            <a:r>
+              <a:rPr lang="cs-CZ" dirty="0" err="1"/>
               <a:t>Tamper</a:t>
             </a:r>
-            <a:endParaRPr lang="cs-CZ" dirty="0" smtClean="0"/>
-          </a:p>
-          <a:p>
-            <a:endParaRPr lang="cs-CZ" dirty="0" smtClean="0"/>
-          </a:p>
-          <a:p>
-            <a:pPr>
-              <a:buNone/>
-            </a:pPr>
-            <a:endParaRPr lang="cs-CZ" dirty="0" smtClean="0"/>
+            <a:endParaRPr lang="cs-CZ" dirty="0"/>
+          </a:p>
+          <a:p>
+            <a:endParaRPr lang="cs-CZ" dirty="0"/>
           </a:p>
           <a:p>
             <a:pPr>
@@ -5209,11 +5151,17 @@
             <a:endParaRPr lang="cs-CZ" dirty="0"/>
           </a:p>
           <a:p>
+            <a:pPr>
+              <a:buNone/>
+            </a:pPr>
+            <a:endParaRPr lang="cs-CZ" dirty="0"/>
+          </a:p>
+          <a:p>
             <a:pPr marL="0">
               <a:buNone/>
             </a:pPr>
             <a:r>
-              <a:rPr lang="cs-CZ" sz="2000" i="1" dirty="0" smtClean="0"/>
+              <a:rPr lang="cs-CZ" sz="2000" i="1" dirty="0"/>
               <a:t>Výdrž 3 roky při měření 1x za hod</a:t>
             </a:r>
           </a:p>
@@ -5228,10 +5176,9 @@
               <a:buNone/>
             </a:pPr>
             <a:r>
-              <a:rPr lang="cs-CZ" sz="2000" i="1" dirty="0" smtClean="0"/>
+              <a:rPr lang="cs-CZ" sz="2000" i="1" dirty="0"/>
               <a:t>Využito 5B 2b, zbytek pronajímáme...</a:t>
             </a:r>
-            <a:endParaRPr lang="cs-CZ" sz="2000" i="1" dirty="0"/>
           </a:p>
         </p:txBody>
       </p:sp>
@@ -5314,22 +5261,21 @@
           <a:lstStyle/>
           <a:p>
             <a:r>
-              <a:rPr lang="cs-CZ" dirty="0" smtClean="0"/>
+              <a:rPr lang="cs-CZ" dirty="0"/>
               <a:t>Instalace</a:t>
             </a:r>
             <a:r>
-              <a:rPr lang="cs-CZ" b="0" baseline="30000" dirty="0" smtClean="0"/>
+              <a:rPr lang="cs-CZ" b="0" baseline="30000" dirty="0"/>
               <a:t> – mobilní </a:t>
             </a:r>
             <a:r>
-              <a:rPr lang="cs-CZ" b="0" baseline="30000" dirty="0" err="1" smtClean="0"/>
+              <a:rPr lang="cs-CZ" b="0" baseline="30000" dirty="0" err="1"/>
               <a:t>app</a:t>
             </a:r>
             <a:r>
-              <a:rPr lang="cs-CZ" b="0" baseline="30000" dirty="0" smtClean="0"/>
+              <a:rPr lang="cs-CZ" b="0" baseline="30000" dirty="0"/>
               <a:t>.</a:t>
             </a:r>
-            <a:endParaRPr lang="cs-CZ" b="0" baseline="30000" dirty="0"/>
           </a:p>
         </p:txBody>
       </p:sp>
@@ -5482,12 +5428,8 @@
           <a:lstStyle/>
           <a:p>
             <a:r>
-              <a:rPr lang="cs-CZ" dirty="0" smtClean="0"/>
-              <a:t>Zpracování </a:t>
-            </a:r>
-            <a:r>
               <a:rPr lang="cs-CZ" dirty="0"/>
-              <a:t>hodnot </a:t>
+              <a:t>Zpracování hodnot </a:t>
             </a:r>
             <a:r>
               <a:rPr lang="cs-CZ" b="0" baseline="30000" dirty="0"/>
@@ -5580,10 +5522,9 @@
           <a:lstStyle/>
           <a:p>
             <a:r>
-              <a:rPr lang="cs-CZ" sz="800" dirty="0" smtClean="0"/>
+              <a:rPr lang="cs-CZ" sz="800" dirty="0"/>
               <a:t>https://app.powerbi.com/view?r=eyJrIjoiMzAyMzgzMDgtY2I0Ni00M2M3LWI2YjEtOTAzYTZiOGQyOGQ2IiwidCI6IjU5NTA1ODkzLWM0ZTEtNDBkNC05NGRhLWMxYmU5MGRhN2I3MCIsImMiOjZ9</a:t>
             </a:r>
-            <a:endParaRPr lang="cs-CZ" sz="800" dirty="0"/>
           </a:p>
         </p:txBody>
       </p:sp>
@@ -5628,10 +5569,9 @@
           <a:lstStyle/>
           <a:p>
             <a:r>
-              <a:rPr lang="cs-CZ" dirty="0" smtClean="0"/>
+              <a:rPr lang="cs-CZ" dirty="0"/>
               <a:t>Co dál</a:t>
             </a:r>
-            <a:endParaRPr lang="cs-CZ" dirty="0"/>
           </a:p>
         </p:txBody>
       </p:sp>
@@ -5697,10 +5637,9 @@
           <a:lstStyle/>
           <a:p>
             <a:r>
-              <a:rPr lang="cs-CZ" dirty="0" smtClean="0"/>
+              <a:rPr lang="cs-CZ" dirty="0"/>
               <a:t>Co dál?</a:t>
             </a:r>
-            <a:endParaRPr lang="cs-CZ" dirty="0"/>
           </a:p>
         </p:txBody>
       </p:sp>
@@ -5720,50 +5659,49 @@
           <a:lstStyle/>
           <a:p>
             <a:r>
-              <a:rPr lang="cs-CZ" dirty="0" smtClean="0"/>
+              <a:rPr lang="cs-CZ" dirty="0"/>
               <a:t>HW (</a:t>
             </a:r>
             <a:r>
-              <a:rPr lang="cs-CZ" dirty="0" err="1" smtClean="0"/>
+              <a:rPr lang="cs-CZ" dirty="0" err="1"/>
               <a:t>low</a:t>
             </a:r>
             <a:r>
-              <a:rPr lang="cs-CZ" dirty="0" smtClean="0"/>
+              <a:rPr lang="cs-CZ" dirty="0"/>
               <a:t>-</a:t>
             </a:r>
             <a:r>
-              <a:rPr lang="cs-CZ" dirty="0" err="1" smtClean="0"/>
+              <a:rPr lang="cs-CZ" dirty="0" err="1"/>
               <a:t>power</a:t>
             </a:r>
             <a:r>
-              <a:rPr lang="cs-CZ" dirty="0" smtClean="0"/>
+              <a:rPr lang="cs-CZ" dirty="0"/>
               <a:t>, radar místo sonaru)</a:t>
             </a:r>
           </a:p>
           <a:p>
             <a:r>
-              <a:rPr lang="cs-CZ" dirty="0" smtClean="0"/>
+              <a:rPr lang="cs-CZ" dirty="0"/>
               <a:t>Detailnější analýza dat</a:t>
             </a:r>
           </a:p>
           <a:p>
             <a:r>
-              <a:rPr lang="cs-CZ" dirty="0" smtClean="0"/>
+              <a:rPr lang="cs-CZ" dirty="0"/>
               <a:t>Upozornění</a:t>
             </a:r>
           </a:p>
           <a:p>
             <a:r>
-              <a:rPr lang="cs-CZ" dirty="0" smtClean="0"/>
+              <a:rPr lang="cs-CZ" dirty="0"/>
               <a:t>API</a:t>
             </a:r>
           </a:p>
           <a:p>
             <a:r>
-              <a:rPr lang="cs-CZ" dirty="0" smtClean="0"/>
+              <a:rPr lang="cs-CZ" dirty="0"/>
               <a:t>…</a:t>
             </a:r>
-            <a:endParaRPr lang="cs-CZ" dirty="0"/>
           </a:p>
         </p:txBody>
       </p:sp>

</xml_diff>